<commit_message>
add custom objects usability & new func for search
</commit_message>
<xml_diff>
--- a/Диплом/Презентация1.pptx
+++ b/Диплом/Презентация1.pptx
@@ -9,7 +9,6 @@
     <p:sldId id="257" r:id="rId3"/>
     <p:sldId id="259" r:id="rId4"/>
     <p:sldId id="260" r:id="rId5"/>
-    <p:sldId id="261" r:id="rId6"/>
   </p:sldIdLst>
   <p:sldSz cx="12192000" cy="6858000"/>
   <p:notesSz cx="6858000" cy="9144000"/>
@@ -8258,488 +8257,6 @@
 </p:sld>
 </file>
 
-<file path=ppt/slides/slide5.xml><?xml version="1.0" encoding="utf-8"?>
-<p:sld xmlns:a="http://schemas.openxmlformats.org/drawingml/2006/main" xmlns:r="http://schemas.openxmlformats.org/officeDocument/2006/relationships" xmlns:p="http://schemas.openxmlformats.org/presentationml/2006/main">
-  <p:cSld>
-    <p:bg>
-      <p:bgPr>
-        <a:solidFill>
-          <a:schemeClr val="bg1"/>
-        </a:solidFill>
-        <a:effectLst/>
-      </p:bgPr>
-    </p:bg>
-    <p:spTree>
-      <p:nvGrpSpPr>
-        <p:cNvPr id="1" name=""/>
-        <p:cNvGrpSpPr/>
-        <p:nvPr/>
-      </p:nvGrpSpPr>
-      <p:grpSpPr>
-        <a:xfrm>
-          <a:off x="0" y="0"/>
-          <a:ext cx="0" cy="0"/>
-          <a:chOff x="0" y="0"/>
-          <a:chExt cx="0" cy="0"/>
-        </a:xfrm>
-      </p:grpSpPr>
-      <p:sp useBgFill="1">
-        <p:nvSpPr>
-          <p:cNvPr id="8" name="Rectangle 7">
-            <a:extLst>
-              <a:ext uri="{FF2B5EF4-FFF2-40B4-BE49-F238E27FC236}">
-                <a16:creationId xmlns:a16="http://schemas.microsoft.com/office/drawing/2014/main" id="{1B15ED52-F352-441B-82BF-E0EA34836D08}"/>
-              </a:ext>
-              <a:ext uri="{C183D7F6-B498-43B3-948B-1728B52AA6E4}">
-                <adec:decorative xmlns:adec="http://schemas.microsoft.com/office/drawing/2017/decorative" val="1"/>
-              </a:ext>
-            </a:extLst>
-          </p:cNvPr>
-          <p:cNvSpPr>
-            <a:spLocks noGrp="1" noRot="1" noChangeAspect="1" noMove="1" noResize="1" noEditPoints="1" noAdjustHandles="1" noChangeArrowheads="1" noChangeShapeType="1" noTextEdit="1"/>
-          </p:cNvSpPr>
-          <p:nvPr>
-            <p:extLst>
-              <p:ext uri="{386F3935-93C4-4BCD-93E2-E3B085C9AB24}">
-                <p16:designElem xmlns:p16="http://schemas.microsoft.com/office/powerpoint/2015/main" val="1"/>
-              </p:ext>
-            </p:extLst>
-          </p:nvPr>
-        </p:nvSpPr>
-        <p:spPr>
-          <a:xfrm>
-            <a:off x="0" y="0"/>
-            <a:ext cx="12192000" cy="6858000"/>
-          </a:xfrm>
-          <a:prstGeom prst="rect">
-            <a:avLst/>
-          </a:prstGeom>
-          <a:ln w="12700" cap="flat" cmpd="sng" algn="ctr">
-            <a:noFill/>
-            <a:prstDash val="solid"/>
-            <a:miter lim="800000"/>
-          </a:ln>
-          <a:effectLst/>
-          <a:extLst>
-            <a:ext uri="{91240B29-F687-4F45-9708-019B960494DF}">
-              <a14:hiddenLine xmlns:a14="http://schemas.microsoft.com/office/drawing/2010/main" w="12700" cap="flat" cmpd="sng" algn="ctr">
-                <a:solidFill>
-                  <a:schemeClr val="accent1">
-                    <a:shade val="50000"/>
-                  </a:schemeClr>
-                </a:solidFill>
-                <a:prstDash val="solid"/>
-                <a:miter lim="800000"/>
-              </a14:hiddenLine>
-            </a:ext>
-          </a:extLst>
-        </p:spPr>
-        <p:style>
-          <a:lnRef idx="2">
-            <a:schemeClr val="accent1">
-              <a:shade val="50000"/>
-            </a:schemeClr>
-          </a:lnRef>
-          <a:fillRef idx="1">
-            <a:schemeClr val="accent1"/>
-          </a:fillRef>
-          <a:effectRef idx="0">
-            <a:schemeClr val="accent1"/>
-          </a:effectRef>
-          <a:fontRef idx="minor">
-            <a:schemeClr val="lt1"/>
-          </a:fontRef>
-        </p:style>
-        <p:txBody>
-          <a:bodyPr rtlCol="0" anchor="ctr"/>
-          <a:lstStyle/>
-          <a:p>
-            <a:pPr algn="ctr"/>
-            <a:endParaRPr lang="en-US"/>
-          </a:p>
-        </p:txBody>
-      </p:sp>
-      <p:sp>
-        <p:nvSpPr>
-          <p:cNvPr id="10" name="Rectangle 9">
-            <a:extLst>
-              <a:ext uri="{FF2B5EF4-FFF2-40B4-BE49-F238E27FC236}">
-                <a16:creationId xmlns:a16="http://schemas.microsoft.com/office/drawing/2014/main" id="{3B2E3793-BFE6-45A2-9B7B-E18844431C99}"/>
-              </a:ext>
-              <a:ext uri="{C183D7F6-B498-43B3-948B-1728B52AA6E4}">
-                <adec:decorative xmlns:adec="http://schemas.microsoft.com/office/drawing/2017/decorative" val="1"/>
-              </a:ext>
-            </a:extLst>
-          </p:cNvPr>
-          <p:cNvSpPr>
-            <a:spLocks noGrp="1" noRot="1" noChangeAspect="1" noMove="1" noResize="1" noEditPoints="1" noAdjustHandles="1" noChangeArrowheads="1" noChangeShapeType="1" noTextEdit="1"/>
-          </p:cNvSpPr>
-          <p:nvPr>
-            <p:extLst>
-              <p:ext uri="{386F3935-93C4-4BCD-93E2-E3B085C9AB24}">
-                <p16:designElem xmlns:p16="http://schemas.microsoft.com/office/powerpoint/2015/main" val="1"/>
-              </p:ext>
-            </p:extLst>
-          </p:nvPr>
-        </p:nvSpPr>
-        <p:spPr>
-          <a:xfrm flipH="1">
-            <a:off x="-1" y="-1"/>
-            <a:ext cx="12191998" cy="1590742"/>
-          </a:xfrm>
-          <a:prstGeom prst="rect">
-            <a:avLst/>
-          </a:prstGeom>
-          <a:gradFill>
-            <a:gsLst>
-              <a:gs pos="0">
-                <a:srgbClr val="000000"/>
-              </a:gs>
-              <a:gs pos="100000">
-                <a:schemeClr val="accent1">
-                  <a:lumMod val="75000"/>
-                </a:schemeClr>
-              </a:gs>
-            </a:gsLst>
-            <a:lin ang="8400000" scaled="0"/>
-          </a:gradFill>
-          <a:ln>
-            <a:noFill/>
-          </a:ln>
-        </p:spPr>
-        <p:style>
-          <a:lnRef idx="2">
-            <a:schemeClr val="accent1">
-              <a:shade val="50000"/>
-            </a:schemeClr>
-          </a:lnRef>
-          <a:fillRef idx="1">
-            <a:schemeClr val="accent1"/>
-          </a:fillRef>
-          <a:effectRef idx="0">
-            <a:schemeClr val="accent1"/>
-          </a:effectRef>
-          <a:fontRef idx="minor">
-            <a:schemeClr val="lt1"/>
-          </a:fontRef>
-        </p:style>
-        <p:txBody>
-          <a:bodyPr rtlCol="0" anchor="ctr"/>
-          <a:lstStyle/>
-          <a:p>
-            <a:pPr algn="ctr"/>
-            <a:endParaRPr lang="en-US"/>
-          </a:p>
-        </p:txBody>
-      </p:sp>
-      <p:sp>
-        <p:nvSpPr>
-          <p:cNvPr id="12" name="Rectangle 11">
-            <a:extLst>
-              <a:ext uri="{FF2B5EF4-FFF2-40B4-BE49-F238E27FC236}">
-                <a16:creationId xmlns:a16="http://schemas.microsoft.com/office/drawing/2014/main" id="{BC4C4868-CB8F-4AF9-9CDB-8108F2C19B67}"/>
-              </a:ext>
-              <a:ext uri="{C183D7F6-B498-43B3-948B-1728B52AA6E4}">
-                <adec:decorative xmlns:adec="http://schemas.microsoft.com/office/drawing/2017/decorative" val="1"/>
-              </a:ext>
-            </a:extLst>
-          </p:cNvPr>
-          <p:cNvSpPr>
-            <a:spLocks noGrp="1" noRot="1" noChangeAspect="1" noMove="1" noResize="1" noEditPoints="1" noAdjustHandles="1" noChangeArrowheads="1" noChangeShapeType="1" noTextEdit="1"/>
-          </p:cNvSpPr>
-          <p:nvPr>
-            <p:extLst>
-              <p:ext uri="{386F3935-93C4-4BCD-93E2-E3B085C9AB24}">
-                <p16:designElem xmlns:p16="http://schemas.microsoft.com/office/powerpoint/2015/main" val="1"/>
-              </p:ext>
-            </p:extLst>
-          </p:nvPr>
-        </p:nvSpPr>
-        <p:spPr>
-          <a:xfrm rot="10800000" flipH="1">
-            <a:off x="-3" y="0"/>
-            <a:ext cx="8115306" cy="1590742"/>
-          </a:xfrm>
-          <a:prstGeom prst="rect">
-            <a:avLst/>
-          </a:prstGeom>
-          <a:gradFill>
-            <a:gsLst>
-              <a:gs pos="20000">
-                <a:schemeClr val="accent1">
-                  <a:alpha val="0"/>
-                </a:schemeClr>
-              </a:gs>
-              <a:gs pos="100000">
-                <a:schemeClr val="accent1">
-                  <a:lumMod val="50000"/>
-                  <a:alpha val="55000"/>
-                </a:schemeClr>
-              </a:gs>
-            </a:gsLst>
-            <a:lin ang="13800000" scaled="0"/>
-          </a:gradFill>
-          <a:ln>
-            <a:noFill/>
-          </a:ln>
-        </p:spPr>
-        <p:style>
-          <a:lnRef idx="2">
-            <a:schemeClr val="accent1">
-              <a:shade val="50000"/>
-            </a:schemeClr>
-          </a:lnRef>
-          <a:fillRef idx="1">
-            <a:schemeClr val="accent1"/>
-          </a:fillRef>
-          <a:effectRef idx="0">
-            <a:schemeClr val="accent1"/>
-          </a:effectRef>
-          <a:fontRef idx="minor">
-            <a:schemeClr val="lt1"/>
-          </a:fontRef>
-        </p:style>
-        <p:txBody>
-          <a:bodyPr rtlCol="0" anchor="ctr"/>
-          <a:lstStyle/>
-          <a:p>
-            <a:pPr algn="ctr"/>
-            <a:endParaRPr lang="en-US"/>
-          </a:p>
-        </p:txBody>
-      </p:sp>
-      <p:sp>
-        <p:nvSpPr>
-          <p:cNvPr id="14" name="Rectangle 13">
-            <a:extLst>
-              <a:ext uri="{FF2B5EF4-FFF2-40B4-BE49-F238E27FC236}">
-                <a16:creationId xmlns:a16="http://schemas.microsoft.com/office/drawing/2014/main" id="{375E0459-6403-40CD-989D-56A4407CA12E}"/>
-              </a:ext>
-              <a:ext uri="{C183D7F6-B498-43B3-948B-1728B52AA6E4}">
-                <adec:decorative xmlns:adec="http://schemas.microsoft.com/office/drawing/2017/decorative" val="1"/>
-              </a:ext>
-            </a:extLst>
-          </p:cNvPr>
-          <p:cNvSpPr>
-            <a:spLocks noGrp="1" noRot="1" noChangeAspect="1" noMove="1" noResize="1" noEditPoints="1" noAdjustHandles="1" noChangeArrowheads="1" noChangeShapeType="1" noTextEdit="1"/>
-          </p:cNvSpPr>
-          <p:nvPr>
-            <p:extLst>
-              <p:ext uri="{386F3935-93C4-4BCD-93E2-E3B085C9AB24}">
-                <p16:designElem xmlns:p16="http://schemas.microsoft.com/office/powerpoint/2015/main" val="1"/>
-              </p:ext>
-            </p:extLst>
-          </p:nvPr>
-        </p:nvSpPr>
-        <p:spPr>
-          <a:xfrm flipH="1">
-            <a:off x="8115299" y="-1"/>
-            <a:ext cx="4076698" cy="1590742"/>
-          </a:xfrm>
-          <a:prstGeom prst="rect">
-            <a:avLst/>
-          </a:prstGeom>
-          <a:gradFill>
-            <a:gsLst>
-              <a:gs pos="0">
-                <a:schemeClr val="accent1">
-                  <a:alpha val="66000"/>
-                </a:schemeClr>
-              </a:gs>
-              <a:gs pos="100000">
-                <a:srgbClr val="000000">
-                  <a:alpha val="30000"/>
-                </a:srgbClr>
-              </a:gs>
-            </a:gsLst>
-            <a:lin ang="13200000" scaled="0"/>
-          </a:gradFill>
-          <a:ln>
-            <a:noFill/>
-          </a:ln>
-        </p:spPr>
-        <p:style>
-          <a:lnRef idx="2">
-            <a:schemeClr val="accent1">
-              <a:shade val="50000"/>
-            </a:schemeClr>
-          </a:lnRef>
-          <a:fillRef idx="1">
-            <a:schemeClr val="accent1"/>
-          </a:fillRef>
-          <a:effectRef idx="0">
-            <a:schemeClr val="accent1"/>
-          </a:effectRef>
-          <a:fontRef idx="minor">
-            <a:schemeClr val="lt1"/>
-          </a:fontRef>
-        </p:style>
-        <p:txBody>
-          <a:bodyPr rtlCol="0" anchor="ctr"/>
-          <a:lstStyle/>
-          <a:p>
-            <a:pPr algn="ctr"/>
-            <a:endParaRPr lang="en-US"/>
-          </a:p>
-        </p:txBody>
-      </p:sp>
-      <p:sp>
-        <p:nvSpPr>
-          <p:cNvPr id="16" name="Rectangle 15">
-            <a:extLst>
-              <a:ext uri="{FF2B5EF4-FFF2-40B4-BE49-F238E27FC236}">
-                <a16:creationId xmlns:a16="http://schemas.microsoft.com/office/drawing/2014/main" id="{53E5B1A8-3AC9-4BD1-9BBC-78CA94F2D1BA}"/>
-              </a:ext>
-              <a:ext uri="{C183D7F6-B498-43B3-948B-1728B52AA6E4}">
-                <adec:decorative xmlns:adec="http://schemas.microsoft.com/office/drawing/2017/decorative" val="1"/>
-              </a:ext>
-            </a:extLst>
-          </p:cNvPr>
-          <p:cNvSpPr>
-            <a:spLocks noGrp="1" noRot="1" noChangeAspect="1" noMove="1" noResize="1" noEditPoints="1" noAdjustHandles="1" noChangeArrowheads="1" noChangeShapeType="1" noTextEdit="1"/>
-          </p:cNvSpPr>
-          <p:nvPr>
-            <p:extLst>
-              <p:ext uri="{386F3935-93C4-4BCD-93E2-E3B085C9AB24}">
-                <p16:designElem xmlns:p16="http://schemas.microsoft.com/office/powerpoint/2015/main" val="1"/>
-              </p:ext>
-            </p:extLst>
-          </p:nvPr>
-        </p:nvSpPr>
-        <p:spPr>
-          <a:xfrm>
-            <a:off x="459350" y="-1"/>
-            <a:ext cx="11732646" cy="1597433"/>
-          </a:xfrm>
-          <a:prstGeom prst="rect">
-            <a:avLst/>
-          </a:prstGeom>
-          <a:gradFill>
-            <a:gsLst>
-              <a:gs pos="50000">
-                <a:srgbClr val="000000">
-                  <a:alpha val="0"/>
-                </a:srgbClr>
-              </a:gs>
-              <a:gs pos="99000">
-                <a:schemeClr val="accent1">
-                  <a:lumMod val="50000"/>
-                  <a:alpha val="52000"/>
-                </a:schemeClr>
-              </a:gs>
-            </a:gsLst>
-            <a:lin ang="16800000" scaled="0"/>
-          </a:gradFill>
-          <a:ln>
-            <a:noFill/>
-          </a:ln>
-        </p:spPr>
-        <p:style>
-          <a:lnRef idx="2">
-            <a:schemeClr val="accent1">
-              <a:shade val="50000"/>
-            </a:schemeClr>
-          </a:lnRef>
-          <a:fillRef idx="1">
-            <a:schemeClr val="accent1"/>
-          </a:fillRef>
-          <a:effectRef idx="0">
-            <a:schemeClr val="accent1"/>
-          </a:effectRef>
-          <a:fontRef idx="minor">
-            <a:schemeClr val="lt1"/>
-          </a:fontRef>
-        </p:style>
-        <p:txBody>
-          <a:bodyPr rtlCol="0" anchor="ctr"/>
-          <a:lstStyle/>
-          <a:p>
-            <a:pPr algn="ctr"/>
-            <a:endParaRPr lang="en-US"/>
-          </a:p>
-        </p:txBody>
-      </p:sp>
-      <p:sp>
-        <p:nvSpPr>
-          <p:cNvPr id="2" name="Заголовок 1">
-            <a:extLst>
-              <a:ext uri="{FF2B5EF4-FFF2-40B4-BE49-F238E27FC236}">
-                <a16:creationId xmlns:a16="http://schemas.microsoft.com/office/drawing/2014/main" id="{2217B265-E64C-8B56-0EF0-2F3BCB4CFEF2}"/>
-              </a:ext>
-            </a:extLst>
-          </p:cNvPr>
-          <p:cNvSpPr>
-            <a:spLocks noGrp="1"/>
-          </p:cNvSpPr>
-          <p:nvPr>
-            <p:ph type="title"/>
-          </p:nvPr>
-        </p:nvSpPr>
-        <p:spPr>
-          <a:xfrm>
-            <a:off x="1371599" y="294538"/>
-            <a:ext cx="9895951" cy="1033669"/>
-          </a:xfrm>
-        </p:spPr>
-        <p:txBody>
-          <a:bodyPr>
-            <a:normAutofit/>
-          </a:bodyPr>
-          <a:lstStyle/>
-          <a:p>
-            <a:endParaRPr lang="ru-RU" sz="4000">
-              <a:solidFill>
-                <a:srgbClr val="FFFFFF"/>
-              </a:solidFill>
-            </a:endParaRPr>
-          </a:p>
-        </p:txBody>
-      </p:sp>
-      <p:sp>
-        <p:nvSpPr>
-          <p:cNvPr id="3" name="Объект 2">
-            <a:extLst>
-              <a:ext uri="{FF2B5EF4-FFF2-40B4-BE49-F238E27FC236}">
-                <a16:creationId xmlns:a16="http://schemas.microsoft.com/office/drawing/2014/main" id="{BCE63299-44B3-C89F-7A53-6C980DE7EA82}"/>
-              </a:ext>
-            </a:extLst>
-          </p:cNvPr>
-          <p:cNvSpPr>
-            <a:spLocks noGrp="1"/>
-          </p:cNvSpPr>
-          <p:nvPr>
-            <p:ph idx="1"/>
-          </p:nvPr>
-        </p:nvSpPr>
-        <p:spPr>
-          <a:xfrm>
-            <a:off x="1371599" y="2318197"/>
-            <a:ext cx="9724031" cy="3683358"/>
-          </a:xfrm>
-        </p:spPr>
-        <p:txBody>
-          <a:bodyPr anchor="ctr">
-            <a:normAutofit/>
-          </a:bodyPr>
-          <a:lstStyle/>
-          <a:p>
-            <a:endParaRPr lang="ru-RU" sz="2000"/>
-          </a:p>
-        </p:txBody>
-      </p:sp>
-    </p:spTree>
-    <p:extLst>
-      <p:ext uri="{BB962C8B-B14F-4D97-AF65-F5344CB8AC3E}">
-        <p14:creationId xmlns:p14="http://schemas.microsoft.com/office/powerpoint/2010/main" val="3362632170"/>
-      </p:ext>
-    </p:extLst>
-  </p:cSld>
-  <p:clrMapOvr>
-    <a:masterClrMapping/>
-  </p:clrMapOvr>
-</p:sld>
-</file>
-
 <file path=ppt/theme/theme1.xml><?xml version="1.0" encoding="utf-8"?>
 <a:theme xmlns:a="http://schemas.openxmlformats.org/drawingml/2006/main" name="Тема Office">
   <a:themeElements>

</xml_diff>